<commit_message>
movido funções para dentro de pasta [organizacao]
</commit_message>
<xml_diff>
--- a/AzureRS_serveless_talk.pptx
+++ b/AzureRS_serveless_talk.pptx
@@ -229,7 +229,7 @@
           <a:p>
             <a:fld id="{F79F9763-4922-4541-8E91-1063C7BC39B1}" type="datetimeFigureOut">
               <a:rPr lang="en-US" smtClean="0"/>
-              <a:t>9/27/2019</a:t>
+              <a:t>9/28/2019</a:t>
             </a:fld>
             <a:endParaRPr lang="en-US"/>
           </a:p>
@@ -3417,7 +3417,7 @@
           <a:p>
             <a:fld id="{F2F45331-AD4E-2A40-863D-40E38027FB72}" type="datetimeFigureOut">
               <a:rPr lang="en-US" smtClean="0"/>
-              <a:t>9/27/2019</a:t>
+              <a:t>9/28/2019</a:t>
             </a:fld>
             <a:endParaRPr lang="en-US"/>
           </a:p>
@@ -3617,7 +3617,7 @@
           <a:p>
             <a:fld id="{F2F45331-AD4E-2A40-863D-40E38027FB72}" type="datetimeFigureOut">
               <a:rPr lang="en-US" smtClean="0"/>
-              <a:t>9/27/2019</a:t>
+              <a:t>9/28/2019</a:t>
             </a:fld>
             <a:endParaRPr lang="en-US"/>
           </a:p>
@@ -3827,7 +3827,7 @@
           <a:p>
             <a:fld id="{F2F45331-AD4E-2A40-863D-40E38027FB72}" type="datetimeFigureOut">
               <a:rPr lang="en-US" smtClean="0"/>
-              <a:t>9/27/2019</a:t>
+              <a:t>9/28/2019</a:t>
             </a:fld>
             <a:endParaRPr lang="en-US"/>
           </a:p>
@@ -4027,7 +4027,7 @@
           <a:p>
             <a:fld id="{F2F45331-AD4E-2A40-863D-40E38027FB72}" type="datetimeFigureOut">
               <a:rPr lang="en-US" smtClean="0"/>
-              <a:t>9/27/2019</a:t>
+              <a:t>9/28/2019</a:t>
             </a:fld>
             <a:endParaRPr lang="en-US"/>
           </a:p>
@@ -4303,7 +4303,7 @@
           <a:p>
             <a:fld id="{F2F45331-AD4E-2A40-863D-40E38027FB72}" type="datetimeFigureOut">
               <a:rPr lang="en-US" smtClean="0"/>
-              <a:t>9/27/2019</a:t>
+              <a:t>9/28/2019</a:t>
             </a:fld>
             <a:endParaRPr lang="en-US"/>
           </a:p>
@@ -4571,7 +4571,7 @@
           <a:p>
             <a:fld id="{F2F45331-AD4E-2A40-863D-40E38027FB72}" type="datetimeFigureOut">
               <a:rPr lang="en-US" smtClean="0"/>
-              <a:t>9/27/2019</a:t>
+              <a:t>9/28/2019</a:t>
             </a:fld>
             <a:endParaRPr lang="en-US"/>
           </a:p>
@@ -4986,7 +4986,7 @@
           <a:p>
             <a:fld id="{F2F45331-AD4E-2A40-863D-40E38027FB72}" type="datetimeFigureOut">
               <a:rPr lang="en-US" smtClean="0"/>
-              <a:t>9/27/2019</a:t>
+              <a:t>9/28/2019</a:t>
             </a:fld>
             <a:endParaRPr lang="en-US"/>
           </a:p>
@@ -5128,7 +5128,7 @@
           <a:p>
             <a:fld id="{F2F45331-AD4E-2A40-863D-40E38027FB72}" type="datetimeFigureOut">
               <a:rPr lang="en-US" smtClean="0"/>
-              <a:t>9/27/2019</a:t>
+              <a:t>9/28/2019</a:t>
             </a:fld>
             <a:endParaRPr lang="en-US"/>
           </a:p>
@@ -5241,7 +5241,7 @@
           <a:p>
             <a:fld id="{F2F45331-AD4E-2A40-863D-40E38027FB72}" type="datetimeFigureOut">
               <a:rPr lang="en-US" smtClean="0"/>
-              <a:t>9/27/2019</a:t>
+              <a:t>9/28/2019</a:t>
             </a:fld>
             <a:endParaRPr lang="en-US"/>
           </a:p>
@@ -5554,7 +5554,7 @@
           <a:p>
             <a:fld id="{F2F45331-AD4E-2A40-863D-40E38027FB72}" type="datetimeFigureOut">
               <a:rPr lang="en-US" smtClean="0"/>
-              <a:t>9/27/2019</a:t>
+              <a:t>9/28/2019</a:t>
             </a:fld>
             <a:endParaRPr lang="en-US"/>
           </a:p>
@@ -5847,7 +5847,7 @@
           <a:p>
             <a:fld id="{F2F45331-AD4E-2A40-863D-40E38027FB72}" type="datetimeFigureOut">
               <a:rPr lang="en-US" smtClean="0"/>
-              <a:t>9/27/2019</a:t>
+              <a:t>9/28/2019</a:t>
             </a:fld>
             <a:endParaRPr lang="en-US"/>
           </a:p>
@@ -6090,7 +6090,7 @@
           <a:p>
             <a:fld id="{F2F45331-AD4E-2A40-863D-40E38027FB72}" type="datetimeFigureOut">
               <a:rPr lang="en-US" smtClean="0"/>
-              <a:t>9/27/2019</a:t>
+              <a:t>9/28/2019</a:t>
             </a:fld>
             <a:endParaRPr lang="en-US"/>
           </a:p>
@@ -8025,13 +8025,13 @@
   <p:clrMapOvr>
     <a:masterClrMapping/>
   </p:clrMapOvr>
-  <mc:AlternateContent xmlns:mc="http://schemas.openxmlformats.org/markup-compatibility/2006">
-    <mc:Choice xmlns:p14="http://schemas.microsoft.com/office/powerpoint/2010/main" Requires="p14">
+  <mc:AlternateContent xmlns:mc="http://schemas.openxmlformats.org/markup-compatibility/2006" xmlns:p14="http://schemas.microsoft.com/office/powerpoint/2010/main">
+    <mc:Choice Requires="p14">
       <p:transition spd="slow" p14:dur="1600">
         <p14:prism isContent="1" isInverted="1"/>
       </p:transition>
     </mc:Choice>
-    <mc:Fallback>
+    <mc:Fallback xmlns="">
       <p:transition spd="slow">
         <p:fade/>
       </p:transition>
@@ -9365,13 +9365,13 @@
   <p:clrMapOvr>
     <a:masterClrMapping/>
   </p:clrMapOvr>
-  <mc:AlternateContent xmlns:mc="http://schemas.openxmlformats.org/markup-compatibility/2006">
-    <mc:Choice xmlns:p159="http://schemas.microsoft.com/office/powerpoint/2015/09/main" Requires="p159">
+  <mc:AlternateContent xmlns:mc="http://schemas.openxmlformats.org/markup-compatibility/2006" xmlns:p159="http://schemas.microsoft.com/office/powerpoint/2015/09/main">
+    <mc:Choice Requires="p159">
       <p:transition xmlns:p14="http://schemas.microsoft.com/office/powerpoint/2010/main" spd="slow" p14:dur="2000">
         <p159:morph option="byObject"/>
       </p:transition>
     </mc:Choice>
-    <mc:Fallback>
+    <mc:Fallback xmlns="">
       <p:transition spd="slow">
         <p:fade/>
       </p:transition>
@@ -12683,13 +12683,13 @@
   <p:clrMapOvr>
     <a:masterClrMapping/>
   </p:clrMapOvr>
-  <mc:AlternateContent xmlns:mc="http://schemas.openxmlformats.org/markup-compatibility/2006">
-    <mc:Choice xmlns:p14="http://schemas.microsoft.com/office/powerpoint/2010/main" Requires="p14">
+  <mc:AlternateContent xmlns:mc="http://schemas.openxmlformats.org/markup-compatibility/2006" xmlns:p14="http://schemas.microsoft.com/office/powerpoint/2010/main">
+    <mc:Choice Requires="p14">
       <p:transition spd="med" p14:dur="700">
         <p:fade/>
       </p:transition>
     </mc:Choice>
-    <mc:Fallback>
+    <mc:Fallback xmlns="">
       <p:transition spd="med">
         <p:fade/>
       </p:transition>
@@ -16535,13 +16535,13 @@
   <p:clrMapOvr>
     <a:masterClrMapping/>
   </p:clrMapOvr>
-  <mc:AlternateContent xmlns:mc="http://schemas.openxmlformats.org/markup-compatibility/2006">
-    <mc:Choice xmlns:p14="http://schemas.microsoft.com/office/powerpoint/2010/main" Requires="p14">
+  <mc:AlternateContent xmlns:mc="http://schemas.openxmlformats.org/markup-compatibility/2006" xmlns:p14="http://schemas.microsoft.com/office/powerpoint/2010/main">
+    <mc:Choice Requires="p14">
       <p:transition spd="slow" p14:dur="1300">
         <p14:pan dir="u"/>
       </p:transition>
     </mc:Choice>
-    <mc:Fallback>
+    <mc:Fallback xmlns="">
       <p:transition spd="slow">
         <p:fade/>
       </p:transition>
@@ -26188,13 +26188,13 @@
   <p:clrMapOvr>
     <a:masterClrMapping/>
   </p:clrMapOvr>
-  <mc:AlternateContent xmlns:mc="http://schemas.openxmlformats.org/markup-compatibility/2006">
-    <mc:Choice xmlns:p14="http://schemas.microsoft.com/office/powerpoint/2010/main" Requires="p14">
+  <mc:AlternateContent xmlns:mc="http://schemas.openxmlformats.org/markup-compatibility/2006" xmlns:p14="http://schemas.microsoft.com/office/powerpoint/2010/main">
+    <mc:Choice Requires="p14">
       <p:transition spd="slow" p14:dur="2000">
         <p14:ferris dir="l"/>
       </p:transition>
     </mc:Choice>
-    <mc:Fallback>
+    <mc:Fallback xmlns="">
       <p:transition spd="slow">
         <p:fade/>
       </p:transition>
@@ -29995,13 +29995,13 @@
   <p:clrMapOvr>
     <a:masterClrMapping/>
   </p:clrMapOvr>
-  <mc:AlternateContent xmlns:mc="http://schemas.openxmlformats.org/markup-compatibility/2006">
-    <mc:Choice xmlns:p14="http://schemas.microsoft.com/office/powerpoint/2010/main" Requires="p14">
+  <mc:AlternateContent xmlns:mc="http://schemas.openxmlformats.org/markup-compatibility/2006" xmlns:p14="http://schemas.microsoft.com/office/powerpoint/2010/main">
+    <mc:Choice Requires="p14">
       <p:transition spd="slow" p14:dur="1600">
         <p14:prism isContent="1" isInverted="1"/>
       </p:transition>
     </mc:Choice>
-    <mc:Fallback>
+    <mc:Fallback xmlns="">
       <p:transition spd="slow">
         <p:fade/>
       </p:transition>
@@ -32274,7 +32274,7 @@
         </p:spPr>
         <p:txBody>
           <a:bodyPr vert="horz" lIns="91440" tIns="45720" rIns="91440" bIns="45720" rtlCol="0" anchor="ctr">
-            <a:normAutofit/>
+            <a:normAutofit fontScale="70000" lnSpcReduction="20000"/>
           </a:bodyPr>
           <a:lstStyle>
             <a:lvl1pPr algn="l" defTabSz="914400" rtl="0" eaLnBrk="1" latinLnBrk="0" hangingPunct="1">
@@ -32360,7 +32360,7 @@
               <a:t>GitHub: </a:t>
             </a:r>
             <a:r>
-              <a:rPr lang="pt-BR" b="0" dirty="0" err="1">
+              <a:rPr lang="pt-BR" b="0">
                 <a:solidFill>
                   <a:schemeClr val="tx1">
                     <a:lumMod val="65000"/>
@@ -32369,20 +32369,49 @@
                 </a:solidFill>
                 <a:latin typeface="Segoe UI" panose="020B0502040204020203" pitchFamily="34" charset="0"/>
               </a:rPr>
-              <a:t>gabriel</a:t>
-            </a:r>
-            <a:r>
-              <a:rPr lang="pt-BR" b="0" dirty="0">
+              <a:t>gabriel-society</a:t>
+            </a:r>
+            <a:endParaRPr lang="pt-BR" b="0" dirty="0">
+              <a:solidFill>
+                <a:schemeClr val="tx1">
+                  <a:lumMod val="65000"/>
+                  <a:lumOff val="35000"/>
+                </a:schemeClr>
+              </a:solidFill>
+              <a:latin typeface="Segoe UI" panose="020B0502040204020203" pitchFamily="34" charset="0"/>
+            </a:endParaRPr>
+          </a:p>
+          <a:p>
+            <a:pPr>
+              <a:lnSpc>
+                <a:spcPct val="160000"/>
+              </a:lnSpc>
+            </a:pPr>
+            <a:r>
+              <a:rPr lang="pt-BR" sz="3100" b="0" dirty="0">
                 <a:solidFill>
-                  <a:schemeClr val="tx1">
-                    <a:lumMod val="65000"/>
-                    <a:lumOff val="35000"/>
-                  </a:schemeClr>
+                  <a:schemeClr val="accent1"/>
                 </a:solidFill>
                 <a:latin typeface="Segoe UI" panose="020B0502040204020203" pitchFamily="34" charset="0"/>
+                <a:cs typeface="Segoe UI" panose="020B0502040204020203" pitchFamily="34" charset="0"/>
               </a:rPr>
-              <a:t>-Society</a:t>
-            </a:r>
+              <a:t>Código fonte: </a:t>
+            </a:r>
+            <a:r>
+              <a:rPr lang="en-US" dirty="0">
+                <a:hlinkClick r:id="rId7"/>
+              </a:rPr>
+              <a:t>https://github.com/gabriel-society/Orquestracao-Serveless</a:t>
+            </a:r>
+            <a:endParaRPr lang="pt-BR" b="0" dirty="0">
+              <a:solidFill>
+                <a:schemeClr val="tx1">
+                  <a:lumMod val="65000"/>
+                  <a:lumOff val="35000"/>
+                </a:schemeClr>
+              </a:solidFill>
+              <a:latin typeface="Segoe UI" panose="020B0502040204020203" pitchFamily="34" charset="0"/>
+            </a:endParaRPr>
           </a:p>
         </p:txBody>
       </p:sp>
@@ -32401,7 +32430,7 @@
           <p:nvPr/>
         </p:nvPicPr>
         <p:blipFill rotWithShape="1">
-          <a:blip r:embed="rId7">
+          <a:blip r:embed="rId8">
             <a:extLst>
               <a:ext uri="{28A0092B-C50C-407E-A947-70E740481C1C}">
                 <a14:useLocalDpi xmlns:a14="http://schemas.microsoft.com/office/drawing/2010/main" val="0"/>
@@ -33128,13 +33157,13 @@
   <p:clrMapOvr>
     <a:masterClrMapping/>
   </p:clrMapOvr>
-  <mc:AlternateContent xmlns:mc="http://schemas.openxmlformats.org/markup-compatibility/2006">
-    <mc:Choice xmlns:p159="http://schemas.microsoft.com/office/powerpoint/2015/09/main" Requires="p159">
+  <mc:AlternateContent xmlns:mc="http://schemas.openxmlformats.org/markup-compatibility/2006" xmlns:p159="http://schemas.microsoft.com/office/powerpoint/2015/09/main">
+    <mc:Choice Requires="p159">
       <p:transition xmlns:p14="http://schemas.microsoft.com/office/powerpoint/2010/main" spd="slow" p14:dur="2000">
         <p159:morph option="byObject"/>
       </p:transition>
     </mc:Choice>
-    <mc:Fallback>
+    <mc:Fallback xmlns="">
       <p:transition spd="slow">
         <p:fade/>
       </p:transition>
@@ -33381,13 +33410,13 @@
   <p:clrMapOvr>
     <a:masterClrMapping/>
   </p:clrMapOvr>
-  <mc:AlternateContent xmlns:mc="http://schemas.openxmlformats.org/markup-compatibility/2006">
-    <mc:Choice xmlns:p159="http://schemas.microsoft.com/office/powerpoint/2015/09/main" Requires="p159">
+  <mc:AlternateContent xmlns:mc="http://schemas.openxmlformats.org/markup-compatibility/2006" xmlns:p159="http://schemas.microsoft.com/office/powerpoint/2015/09/main">
+    <mc:Choice Requires="p159">
       <p:transition xmlns:p14="http://schemas.microsoft.com/office/powerpoint/2010/main" spd="slow" p14:dur="2000">
         <p159:morph option="byObject"/>
       </p:transition>
     </mc:Choice>
-    <mc:Fallback>
+    <mc:Fallback xmlns="">
       <p:transition spd="slow">
         <p:fade/>
       </p:transition>
@@ -33582,13 +33611,13 @@
   <p:clrMapOvr>
     <a:masterClrMapping/>
   </p:clrMapOvr>
-  <mc:AlternateContent xmlns:mc="http://schemas.openxmlformats.org/markup-compatibility/2006">
-    <mc:Choice xmlns:p159="http://schemas.microsoft.com/office/powerpoint/2015/09/main" Requires="p159">
+  <mc:AlternateContent xmlns:mc="http://schemas.openxmlformats.org/markup-compatibility/2006" xmlns:p159="http://schemas.microsoft.com/office/powerpoint/2015/09/main">
+    <mc:Choice Requires="p159">
       <p:transition xmlns:p14="http://schemas.microsoft.com/office/powerpoint/2010/main" spd="slow" p14:dur="2000">
         <p159:morph option="byObject"/>
       </p:transition>
     </mc:Choice>
-    <mc:Fallback>
+    <mc:Fallback xmlns="">
       <p:transition spd="slow">
         <p:fade/>
       </p:transition>
@@ -33955,13 +33984,13 @@
   <p:clrMapOvr>
     <a:masterClrMapping/>
   </p:clrMapOvr>
-  <mc:AlternateContent xmlns:mc="http://schemas.openxmlformats.org/markup-compatibility/2006">
-    <mc:Choice xmlns:p159="http://schemas.microsoft.com/office/powerpoint/2015/09/main" Requires="p159">
+  <mc:AlternateContent xmlns:mc="http://schemas.openxmlformats.org/markup-compatibility/2006" xmlns:p159="http://schemas.microsoft.com/office/powerpoint/2015/09/main">
+    <mc:Choice Requires="p159">
       <p:transition xmlns:p14="http://schemas.microsoft.com/office/powerpoint/2010/main" spd="slow" p14:dur="2000">
         <p159:morph option="byObject"/>
       </p:transition>
     </mc:Choice>
-    <mc:Fallback>
+    <mc:Fallback xmlns="">
       <p:transition spd="slow">
         <p:fade/>
       </p:transition>
@@ -34923,12 +34952,6 @@
 </file>
 
 <file path=customXml/item1.xml><?xml version="1.0" encoding="utf-8"?>
-<p:properties xmlns:p="http://schemas.microsoft.com/office/2006/metadata/properties" xmlns:xsi="http://www.w3.org/2001/XMLSchema-instance" xmlns:pc="http://schemas.microsoft.com/office/infopath/2007/PartnerControls">
-  <documentManagement/>
-</p:properties>
-</file>
-
-<file path=customXml/item2.xml><?xml version="1.0" encoding="utf-8"?>
 <ct:contentTypeSchema xmlns:ct="http://schemas.microsoft.com/office/2006/metadata/contentType" xmlns:ma="http://schemas.microsoft.com/office/2006/metadata/properties/metaAttributes" ct:_="" ma:_="" ma:contentTypeName="Document" ma:contentTypeID="0x010100840AB34A05C2544B99336876EEAAE0FD" ma:contentTypeVersion="7" ma:contentTypeDescription="Create a new document." ma:contentTypeScope="" ma:versionID="39451efbcb4e875c3e3a18735ad4ff7e">
   <xsd:schema xmlns:xsd="http://www.w3.org/2001/XMLSchema" xmlns:xs="http://www.w3.org/2001/XMLSchema" xmlns:p="http://schemas.microsoft.com/office/2006/metadata/properties" xmlns:ns2="1abd25fe-9786-40f8-b7cd-673c3f411738" targetNamespace="http://schemas.microsoft.com/office/2006/metadata/properties" ma:root="true" ma:fieldsID="8d5f5ac6326b2c3a5db09ce55eac7eb5" ns2:_="">
     <xsd:import namespace="1abd25fe-9786-40f8-b7cd-673c3f411738"/>
@@ -35092,6 +35115,12 @@
 </ct:contentTypeSchema>
 </file>
 
+<file path=customXml/item2.xml><?xml version="1.0" encoding="utf-8"?>
+<p:properties xmlns:p="http://schemas.microsoft.com/office/2006/metadata/properties" xmlns:xsi="http://www.w3.org/2001/XMLSchema-instance" xmlns:pc="http://schemas.microsoft.com/office/infopath/2007/PartnerControls">
+  <documentManagement/>
+</p:properties>
+</file>
+
 <file path=customXml/item3.xml><?xml version="1.0" encoding="utf-8"?>
 <?mso-contentType ?>
 <FormTemplates xmlns="http://schemas.microsoft.com/sharepoint/v3/contenttype/forms">
@@ -35102,22 +35131,6 @@
 </file>
 
 <file path=customXml/itemProps1.xml><?xml version="1.0" encoding="utf-8"?>
-<ds:datastoreItem xmlns:ds="http://schemas.openxmlformats.org/officeDocument/2006/customXml" ds:itemID="{42D82588-6EDE-4571-B4EC-E9E0684CDC84}">
-  <ds:schemaRefs>
-    <ds:schemaRef ds:uri="http://schemas.microsoft.com/office/infopath/2007/PartnerControls"/>
-    <ds:schemaRef ds:uri="http://schemas.microsoft.com/office/2006/documentManagement/types"/>
-    <ds:schemaRef ds:uri="http://purl.org/dc/elements/1.1/"/>
-    <ds:schemaRef ds:uri="http://schemas.microsoft.com/office/2006/metadata/properties"/>
-    <ds:schemaRef ds:uri="http://purl.org/dc/terms/"/>
-    <ds:schemaRef ds:uri="http://schemas.openxmlformats.org/package/2006/metadata/core-properties"/>
-    <ds:schemaRef ds:uri="http://purl.org/dc/dcmitype/"/>
-    <ds:schemaRef ds:uri="1abd25fe-9786-40f8-b7cd-673c3f411738"/>
-    <ds:schemaRef ds:uri="http://www.w3.org/XML/1998/namespace"/>
-  </ds:schemaRefs>
-</ds:datastoreItem>
-</file>
-
-<file path=customXml/itemProps2.xml><?xml version="1.0" encoding="utf-8"?>
 <ds:datastoreItem xmlns:ds="http://schemas.openxmlformats.org/officeDocument/2006/customXml" ds:itemID="{E49C23A5-22F3-4571-ADC0-E6E8C8E75C94}">
   <ds:schemaRefs>
     <ds:schemaRef ds:uri="http://schemas.microsoft.com/office/2006/metadata/contentType"/>
@@ -35135,6 +35148,22 @@
 </ds:datastoreItem>
 </file>
 
+<file path=customXml/itemProps2.xml><?xml version="1.0" encoding="utf-8"?>
+<ds:datastoreItem xmlns:ds="http://schemas.openxmlformats.org/officeDocument/2006/customXml" ds:itemID="{42D82588-6EDE-4571-B4EC-E9E0684CDC84}">
+  <ds:schemaRefs>
+    <ds:schemaRef ds:uri="http://schemas.microsoft.com/office/infopath/2007/PartnerControls"/>
+    <ds:schemaRef ds:uri="http://schemas.microsoft.com/office/2006/documentManagement/types"/>
+    <ds:schemaRef ds:uri="http://purl.org/dc/elements/1.1/"/>
+    <ds:schemaRef ds:uri="http://schemas.microsoft.com/office/2006/metadata/properties"/>
+    <ds:schemaRef ds:uri="http://purl.org/dc/terms/"/>
+    <ds:schemaRef ds:uri="http://schemas.openxmlformats.org/package/2006/metadata/core-properties"/>
+    <ds:schemaRef ds:uri="http://purl.org/dc/dcmitype/"/>
+    <ds:schemaRef ds:uri="1abd25fe-9786-40f8-b7cd-673c3f411738"/>
+    <ds:schemaRef ds:uri="http://www.w3.org/XML/1998/namespace"/>
+  </ds:schemaRefs>
+</ds:datastoreItem>
+</file>
+
 <file path=customXml/itemProps3.xml><?xml version="1.0" encoding="utf-8"?>
 <ds:datastoreItem xmlns:ds="http://schemas.openxmlformats.org/officeDocument/2006/customXml" ds:itemID="{BB26DFB1-9C35-4C5E-B7F1-81DC8ADD8202}">
   <ds:schemaRefs>

</xml_diff>